<commit_message>
se definen clases en homebanking
</commit_message>
<xml_diff>
--- a/Clase 32/Clase 32 - Historias de usuario- Scrum.pptx
+++ b/Clase 32/Clase 32 - Historias de usuario- Scrum.pptx
@@ -261,7 +261,7 @@
   </p:defaultTextStyle>
   <p:extLst>
     <p:ext uri="{EFAFB233-063F-42B5-8137-9DF3F51BA10A}">
-      <p15:sldGuideLst xmlns:p15="http://schemas.microsoft.com/office/powerpoint/2012/main" xmlns:p14="http://schemas.microsoft.com/office/powerpoint/2010/main" xmlns:com="http://schemas.openxmlformats.org/drawingml/2006/compatibility" xmlns:pvml="urn:schemas-microsoft-com:office:powerpoint" xmlns:v="urn:schemas-microsoft-com:vml" xmlns:o="urn:schemas-microsoft-com:office:office" xmlns:dgm="http://schemas.openxmlformats.org/drawingml/2006/diagram" xmlns:c="http://schemas.openxmlformats.org/drawingml/2006/chart" xmlns:mv="urn:schemas-microsoft-com:mac:vml" xmlns:mc="http://schemas.openxmlformats.org/markup-compatibility/2006" xmlns="">
+      <p15:sldGuideLst xmlns="" xmlns:mc="http://schemas.openxmlformats.org/markup-compatibility/2006" xmlns:mv="urn:schemas-microsoft-com:mac:vml" xmlns:c="http://schemas.openxmlformats.org/drawingml/2006/chart" xmlns:dgm="http://schemas.openxmlformats.org/drawingml/2006/diagram" xmlns:o="urn:schemas-microsoft-com:office:office" xmlns:v="urn:schemas-microsoft-com:vml" xmlns:pvml="urn:schemas-microsoft-com:office:powerpoint" xmlns:com="http://schemas.openxmlformats.org/drawingml/2006/compatibility" xmlns:p14="http://schemas.microsoft.com/office/powerpoint/2010/main" xmlns:p15="http://schemas.microsoft.com/office/powerpoint/2012/main">
         <p15:guide id="1" orient="horz" pos="1620">
           <p15:clr>
             <a:srgbClr val="A4A3A4"/>
@@ -22489,15 +22489,7 @@
                   <a:schemeClr val="dk1"/>
                 </a:solidFill>
               </a:rPr>
-              <a:t>Espacio para dudas y consultas – Prácticos</a:t>
-            </a:r>
-            <a:r>
-              <a:rPr lang="en" sz="2000" dirty="0" smtClean="0">
-                <a:solidFill>
-                  <a:schemeClr val="dk1"/>
-                </a:solidFill>
-              </a:rPr>
-              <a:t>.</a:t>
+              <a:t>Espacio para dudas y consultas – Prácticos.</a:t>
             </a:r>
             <a:endParaRPr sz="2000" dirty="0">
               <a:solidFill>
@@ -24194,11 +24186,6 @@
               </a:rPr>
               <a:t> – Historias de usuario</a:t>
             </a:r>
-            <a:endParaRPr lang="es-ES" sz="2000" b="1" dirty="0">
-              <a:solidFill>
-                <a:schemeClr val="dk1"/>
-              </a:solidFill>
-            </a:endParaRPr>
           </a:p>
         </p:txBody>
       </p:sp>
@@ -24463,11 +24450,6 @@
               </a:rPr>
               <a:t> – Historias de usuario</a:t>
             </a:r>
-            <a:endParaRPr lang="es-ES" sz="2000" b="1" dirty="0">
-              <a:solidFill>
-                <a:schemeClr val="dk1"/>
-              </a:solidFill>
-            </a:endParaRPr>
           </a:p>
         </p:txBody>
       </p:sp>

</xml_diff>